<commit_message>
:bento: Update point of socket.accept() asset
by feedback
</commit_message>
<xml_diff>
--- a/16/yongki/WebServer.pptx
+++ b/16/yongki/WebServer.pptx
@@ -251,7 +251,7 @@
           <a:p>
             <a:fld id="{278A5395-7299-4714-9E5C-8983F2B9A6E7}" type="datetimeFigureOut">
               <a:rPr lang="ko-KR" altLang="en-US" smtClean="0"/>
-              <a:t>2022-04-16</a:t>
+              <a:t>2022-04-17</a:t>
             </a:fld>
             <a:endParaRPr lang="ko-KR" altLang="en-US"/>
           </a:p>
@@ -516,6 +516,90 @@
     </a:lvl9pPr>
   </p:notesStyle>
 </p:notesMaster>
+</file>
+
+<file path=ppt/notesSlides/notesSlide1.xml><?xml version="1.0" encoding="utf-8"?>
+<p:notes xmlns:a="http://schemas.openxmlformats.org/drawingml/2006/main" xmlns:r="http://schemas.openxmlformats.org/officeDocument/2006/relationships" xmlns:p="http://schemas.openxmlformats.org/presentationml/2006/main">
+  <p:cSld>
+    <p:spTree>
+      <p:nvGrpSpPr>
+        <p:cNvPr id="1" name=""/>
+        <p:cNvGrpSpPr/>
+        <p:nvPr/>
+      </p:nvGrpSpPr>
+      <p:grpSpPr>
+        <a:xfrm>
+          <a:off x="0" y="0"/>
+          <a:ext cx="0" cy="0"/>
+          <a:chOff x="0" y="0"/>
+          <a:chExt cx="0" cy="0"/>
+        </a:xfrm>
+      </p:grpSpPr>
+      <p:sp>
+        <p:nvSpPr>
+          <p:cNvPr id="2" name="슬라이드 이미지 개체 틀 1"/>
+          <p:cNvSpPr>
+            <a:spLocks noGrp="1" noRot="1" noChangeAspect="1"/>
+          </p:cNvSpPr>
+          <p:nvPr>
+            <p:ph type="sldImg"/>
+          </p:nvPr>
+        </p:nvSpPr>
+        <p:spPr/>
+      </p:sp>
+      <p:sp>
+        <p:nvSpPr>
+          <p:cNvPr id="3" name="슬라이드 노트 개체 틀 2"/>
+          <p:cNvSpPr>
+            <a:spLocks noGrp="1"/>
+          </p:cNvSpPr>
+          <p:nvPr>
+            <p:ph type="body" idx="1"/>
+          </p:nvPr>
+        </p:nvSpPr>
+        <p:spPr/>
+        <p:txBody>
+          <a:bodyPr/>
+          <a:lstStyle/>
+          <a:p>
+            <a:endParaRPr lang="ko-KR" altLang="en-US"/>
+          </a:p>
+        </p:txBody>
+      </p:sp>
+      <p:sp>
+        <p:nvSpPr>
+          <p:cNvPr id="4" name="슬라이드 번호 개체 틀 3"/>
+          <p:cNvSpPr>
+            <a:spLocks noGrp="1"/>
+          </p:cNvSpPr>
+          <p:nvPr>
+            <p:ph type="sldNum" sz="quarter" idx="5"/>
+          </p:nvPr>
+        </p:nvSpPr>
+        <p:spPr/>
+        <p:txBody>
+          <a:bodyPr/>
+          <a:lstStyle/>
+          <a:p>
+            <a:fld id="{135C8A8A-C00E-495C-AA78-E91BBCD525AD}" type="slidenum">
+              <a:rPr lang="ko-KR" altLang="en-US" smtClean="0"/>
+              <a:t>3</a:t>
+            </a:fld>
+            <a:endParaRPr lang="ko-KR" altLang="en-US"/>
+          </a:p>
+        </p:txBody>
+      </p:sp>
+    </p:spTree>
+    <p:extLst>
+      <p:ext uri="{BB962C8B-B14F-4D97-AF65-F5344CB8AC3E}">
+        <p14:creationId xmlns:p14="http://schemas.microsoft.com/office/powerpoint/2010/main" val="3220991876"/>
+      </p:ext>
+    </p:extLst>
+  </p:cSld>
+  <p:clrMapOvr>
+    <a:masterClrMapping/>
+  </p:clrMapOvr>
+</p:notes>
 </file>
 
 <file path=ppt/slideLayouts/slideLayout1.xml><?xml version="1.0" encoding="utf-8"?>
@@ -4550,11 +4634,144 @@
           </a:p>
         </p:txBody>
       </p:sp>
+      <p:pic>
+        <p:nvPicPr>
+          <p:cNvPr id="2" name="오디오 1">
+            <a:hlinkClick r:id="" action="ppaction://media"/>
+            <a:extLst>
+              <a:ext uri="{FF2B5EF4-FFF2-40B4-BE49-F238E27FC236}">
+                <a16:creationId xmlns:a16="http://schemas.microsoft.com/office/drawing/2014/main" id="{270BAA96-0873-4F72-BDC8-6BF12F34A882}"/>
+              </a:ext>
+            </a:extLst>
+          </p:cNvPr>
+          <p:cNvPicPr>
+            <a:picLocks noChangeAspect="1"/>
+          </p:cNvPicPr>
+          <p:nvPr>
+            <a:audioFile r:link="rId2"/>
+            <p:extLst>
+              <p:ext uri="{DAA4B4D4-6D71-4841-9C94-3DE7FCFB9230}">
+                <p14:media xmlns:p14="http://schemas.microsoft.com/office/powerpoint/2010/main" r:embed="rId1"/>
+              </p:ext>
+            </p:extLst>
+          </p:nvPr>
+        </p:nvPicPr>
+        <p:blipFill>
+          <a:blip r:embed="rId4"/>
+          <a:stretch>
+            <a:fillRect/>
+          </a:stretch>
+        </p:blipFill>
+        <p:spPr>
+          <a:xfrm>
+            <a:off x="8521700" y="6235700"/>
+            <a:ext cx="406400" cy="406400"/>
+          </a:xfrm>
+          <a:prstGeom prst="rect">
+            <a:avLst/>
+          </a:prstGeom>
+        </p:spPr>
+      </p:pic>
     </p:spTree>
   </p:cSld>
   <p:clrMapOvr>
     <a:masterClrMapping/>
   </p:clrMapOvr>
+  <mc:AlternateContent xmlns:mc="http://schemas.openxmlformats.org/markup-compatibility/2006" xmlns:p14="http://schemas.microsoft.com/office/powerpoint/2010/main">
+    <mc:Choice Requires="p14">
+      <p:transition spd="slow" p14:dur="2000" advTm="7310"/>
+    </mc:Choice>
+    <mc:Fallback xmlns="">
+      <p:transition spd="slow" advTm="7310"/>
+    </mc:Fallback>
+  </mc:AlternateContent>
+  <p:timing>
+    <p:tnLst>
+      <p:par>
+        <p:cTn id="1" dur="indefinite" restart="never" nodeType="tmRoot">
+          <p:childTnLst>
+            <p:seq concurrent="1" nextAc="seek">
+              <p:cTn id="2" dur="indefinite" nodeType="mainSeq">
+                <p:childTnLst>
+                  <p:par>
+                    <p:cTn id="3" fill="hold">
+                      <p:stCondLst>
+                        <p:cond delay="indefinite"/>
+                        <p:cond evt="onBegin" delay="0">
+                          <p:tn val="2"/>
+                        </p:cond>
+                      </p:stCondLst>
+                      <p:childTnLst>
+                        <p:par>
+                          <p:cTn id="4" fill="hold">
+                            <p:stCondLst>
+                              <p:cond delay="0"/>
+                            </p:stCondLst>
+                            <p:childTnLst>
+                              <p:par>
+                                <p:cTn id="5" presetID="1" presetClass="mediacall" presetSubtype="0" fill="hold" nodeType="afterEffect">
+                                  <p:stCondLst>
+                                    <p:cond delay="0"/>
+                                  </p:stCondLst>
+                                  <p:childTnLst>
+                                    <p:cmd type="call" cmd="playFrom(0.0)">
+                                      <p:cBhvr>
+                                        <p:cTn id="6" dur="1" fill="hold"/>
+                                        <p:tgtEl>
+                                          <p:spTgt spid="2"/>
+                                        </p:tgtEl>
+                                      </p:cBhvr>
+                                    </p:cmd>
+                                  </p:childTnLst>
+                                </p:cTn>
+                              </p:par>
+                            </p:childTnLst>
+                          </p:cTn>
+                        </p:par>
+                      </p:childTnLst>
+                    </p:cTn>
+                  </p:par>
+                </p:childTnLst>
+              </p:cTn>
+              <p:prevCondLst>
+                <p:cond evt="onPrev" delay="0">
+                  <p:tgtEl>
+                    <p:sldTgt/>
+                  </p:tgtEl>
+                </p:cond>
+              </p:prevCondLst>
+              <p:nextCondLst>
+                <p:cond evt="onNext" delay="0">
+                  <p:tgtEl>
+                    <p:sldTgt/>
+                  </p:tgtEl>
+                </p:cond>
+              </p:nextCondLst>
+            </p:seq>
+            <p:audio isNarration="1">
+              <p:cMediaNode vol="80000" showWhenStopped="0">
+                <p:cTn id="7" fill="hold" display="0">
+                  <p:stCondLst>
+                    <p:cond delay="indefinite"/>
+                  </p:stCondLst>
+                  <p:endCondLst>
+                    <p:cond evt="onStopAudio" delay="0">
+                      <p:tgtEl>
+                        <p:sldTgt/>
+                      </p:tgtEl>
+                    </p:cond>
+                  </p:endCondLst>
+                </p:cTn>
+                <p:tgtEl>
+                  <p:spTgt spid="2"/>
+                </p:tgtEl>
+              </p:cMediaNode>
+            </p:audio>
+          </p:childTnLst>
+        </p:cTn>
+      </p:par>
+    </p:tnLst>
+  </p:timing>
 </p:sld>
 </file>
 
@@ -8753,10 +8970,10 @@
       </p:sp>
       <p:pic>
         <p:nvPicPr>
-          <p:cNvPr id="9" name="그림 8">
+          <p:cNvPr id="4" name="그림 3">
             <a:extLst>
               <a:ext uri="{FF2B5EF4-FFF2-40B4-BE49-F238E27FC236}">
-                <a16:creationId xmlns:a16="http://schemas.microsoft.com/office/drawing/2014/main" id="{12851776-EEB8-4C38-ADED-6D0B0500CF02}"/>
+                <a16:creationId xmlns:a16="http://schemas.microsoft.com/office/drawing/2014/main" id="{FA581408-571F-442B-8B4B-93E9784A3D8C}"/>
               </a:ext>
             </a:extLst>
           </p:cNvPr>
@@ -8773,8 +8990,8 @@
         </p:blipFill>
         <p:spPr>
           <a:xfrm>
-            <a:off x="0" y="1916832"/>
-            <a:ext cx="9144000" cy="4171097"/>
+            <a:off x="688758" y="1988840"/>
+            <a:ext cx="7998042" cy="4740990"/>
           </a:xfrm>
           <a:prstGeom prst="rect">
             <a:avLst/>
@@ -8791,11 +9008,11 @@
   <p:clrMapOvr>
     <a:masterClrMapping/>
   </p:clrMapOvr>
-  <mc:AlternateContent xmlns:mc="http://schemas.openxmlformats.org/markup-compatibility/2006">
-    <mc:Choice xmlns:p14="http://schemas.microsoft.com/office/powerpoint/2010/main" Requires="p14">
+  <mc:AlternateContent xmlns:mc="http://schemas.openxmlformats.org/markup-compatibility/2006" xmlns:p14="http://schemas.microsoft.com/office/powerpoint/2010/main">
+    <mc:Choice Requires="p14">
       <p:transition p14:dur="10"/>
     </mc:Choice>
-    <mc:Fallback>
+    <mc:Fallback xmlns="">
       <p:transition/>
     </mc:Fallback>
   </mc:AlternateContent>
@@ -9194,16 +9411,15 @@
           </p:cNvPicPr>
           <p:nvPr/>
         </p:nvPicPr>
-        <p:blipFill>
+        <p:blipFill rotWithShape="1">
           <a:blip r:embed="rId2"/>
-          <a:stretch>
-            <a:fillRect/>
-          </a:stretch>
+          <a:srcRect l="5000"/>
+          <a:stretch/>
         </p:blipFill>
         <p:spPr>
           <a:xfrm>
-            <a:off x="0" y="1484313"/>
-            <a:ext cx="9144000" cy="4523491"/>
+            <a:off x="21628" y="1282669"/>
+            <a:ext cx="9100743" cy="4739044"/>
           </a:xfrm>
           <a:prstGeom prst="rect">
             <a:avLst/>
@@ -10475,11 +10691,144 @@
           </p:txBody>
         </p:sp>
       </p:grpSp>
+      <p:pic>
+        <p:nvPicPr>
+          <p:cNvPr id="5" name="오디오 4">
+            <a:hlinkClick r:id="" action="ppaction://media"/>
+            <a:extLst>
+              <a:ext uri="{FF2B5EF4-FFF2-40B4-BE49-F238E27FC236}">
+                <a16:creationId xmlns:a16="http://schemas.microsoft.com/office/drawing/2014/main" id="{2F587EA6-9A86-496E-A745-3808011EE54E}"/>
+              </a:ext>
+            </a:extLst>
+          </p:cNvPr>
+          <p:cNvPicPr>
+            <a:picLocks noChangeAspect="1"/>
+          </p:cNvPicPr>
+          <p:nvPr>
+            <a:audioFile r:link="rId2"/>
+            <p:extLst>
+              <p:ext uri="{DAA4B4D4-6D71-4841-9C94-3DE7FCFB9230}">
+                <p14:media xmlns:p14="http://schemas.microsoft.com/office/powerpoint/2010/main" r:embed="rId1"/>
+              </p:ext>
+            </p:extLst>
+          </p:nvPr>
+        </p:nvPicPr>
+        <p:blipFill>
+          <a:blip r:embed="rId4"/>
+          <a:stretch>
+            <a:fillRect/>
+          </a:stretch>
+        </p:blipFill>
+        <p:spPr>
+          <a:xfrm>
+            <a:off x="8521700" y="6235700"/>
+            <a:ext cx="406400" cy="406400"/>
+          </a:xfrm>
+          <a:prstGeom prst="rect">
+            <a:avLst/>
+          </a:prstGeom>
+        </p:spPr>
+      </p:pic>
     </p:spTree>
   </p:cSld>
   <p:clrMapOvr>
     <a:masterClrMapping/>
   </p:clrMapOvr>
+  <mc:AlternateContent xmlns:mc="http://schemas.openxmlformats.org/markup-compatibility/2006" xmlns:p14="http://schemas.microsoft.com/office/powerpoint/2010/main">
+    <mc:Choice Requires="p14">
+      <p:transition spd="slow" p14:dur="2000" advTm="564"/>
+    </mc:Choice>
+    <mc:Fallback xmlns="">
+      <p:transition spd="slow" advTm="564"/>
+    </mc:Fallback>
+  </mc:AlternateContent>
+  <p:timing>
+    <p:tnLst>
+      <p:par>
+        <p:cTn id="1" dur="indefinite" restart="never" nodeType="tmRoot">
+          <p:childTnLst>
+            <p:seq concurrent="1" nextAc="seek">
+              <p:cTn id="2" dur="indefinite" nodeType="mainSeq">
+                <p:childTnLst>
+                  <p:par>
+                    <p:cTn id="3" fill="hold">
+                      <p:stCondLst>
+                        <p:cond delay="indefinite"/>
+                        <p:cond evt="onBegin" delay="0">
+                          <p:tn val="2"/>
+                        </p:cond>
+                      </p:stCondLst>
+                      <p:childTnLst>
+                        <p:par>
+                          <p:cTn id="4" fill="hold">
+                            <p:stCondLst>
+                              <p:cond delay="0"/>
+                            </p:stCondLst>
+                            <p:childTnLst>
+                              <p:par>
+                                <p:cTn id="5" presetID="1" presetClass="mediacall" presetSubtype="0" fill="hold" nodeType="afterEffect">
+                                  <p:stCondLst>
+                                    <p:cond delay="0"/>
+                                  </p:stCondLst>
+                                  <p:childTnLst>
+                                    <p:cmd type="call" cmd="playFrom(0.0)">
+                                      <p:cBhvr>
+                                        <p:cTn id="6" dur="1" fill="hold"/>
+                                        <p:tgtEl>
+                                          <p:spTgt spid="5"/>
+                                        </p:tgtEl>
+                                      </p:cBhvr>
+                                    </p:cmd>
+                                  </p:childTnLst>
+                                </p:cTn>
+                              </p:par>
+                            </p:childTnLst>
+                          </p:cTn>
+                        </p:par>
+                      </p:childTnLst>
+                    </p:cTn>
+                  </p:par>
+                </p:childTnLst>
+              </p:cTn>
+              <p:prevCondLst>
+                <p:cond evt="onPrev" delay="0">
+                  <p:tgtEl>
+                    <p:sldTgt/>
+                  </p:tgtEl>
+                </p:cond>
+              </p:prevCondLst>
+              <p:nextCondLst>
+                <p:cond evt="onNext" delay="0">
+                  <p:tgtEl>
+                    <p:sldTgt/>
+                  </p:tgtEl>
+                </p:cond>
+              </p:nextCondLst>
+            </p:seq>
+            <p:audio isNarration="1">
+              <p:cMediaNode vol="80000" showWhenStopped="0">
+                <p:cTn id="7" fill="hold" display="0">
+                  <p:stCondLst>
+                    <p:cond delay="indefinite"/>
+                  </p:stCondLst>
+                  <p:endCondLst>
+                    <p:cond evt="onStopAudio" delay="0">
+                      <p:tgtEl>
+                        <p:sldTgt/>
+                      </p:tgtEl>
+                    </p:cond>
+                  </p:endCondLst>
+                </p:cTn>
+                <p:tgtEl>
+                  <p:spTgt spid="5"/>
+                </p:tgtEl>
+              </p:cMediaNode>
+            </p:audio>
+          </p:childTnLst>
+        </p:cTn>
+      </p:par>
+    </p:tnLst>
+  </p:timing>
 </p:sld>
 </file>
 
@@ -10743,6 +11092,14 @@
   <p:clrMapOvr>
     <a:masterClrMapping/>
   </p:clrMapOvr>
+  <mc:AlternateContent xmlns:mc="http://schemas.openxmlformats.org/markup-compatibility/2006" xmlns:p14="http://schemas.microsoft.com/office/powerpoint/2010/main">
+    <mc:Choice Requires="p14">
+      <p:transition spd="slow" p14:dur="2000" advTm="6633"/>
+    </mc:Choice>
+    <mc:Fallback xmlns="">
+      <p:transition spd="slow" advTm="6633"/>
+    </mc:Fallback>
+  </mc:AlternateContent>
 </p:sld>
 </file>
 
@@ -11639,36 +11996,6 @@
           <a:chExt cx="0" cy="0"/>
         </a:xfrm>
       </p:grpSpPr>
-      <p:pic>
-        <p:nvPicPr>
-          <p:cNvPr id="5" name="그림 4">
-            <a:extLst>
-              <a:ext uri="{FF2B5EF4-FFF2-40B4-BE49-F238E27FC236}">
-                <a16:creationId xmlns:a16="http://schemas.microsoft.com/office/drawing/2014/main" id="{3592E9CD-9BBC-4804-A5DE-07154FDCF517}"/>
-              </a:ext>
-            </a:extLst>
-          </p:cNvPr>
-          <p:cNvPicPr>
-            <a:picLocks noChangeAspect="1"/>
-          </p:cNvPicPr>
-          <p:nvPr/>
-        </p:nvPicPr>
-        <p:blipFill>
-          <a:blip r:embed="rId2"/>
-          <a:stretch>
-            <a:fillRect/>
-          </a:stretch>
-        </p:blipFill>
-        <p:spPr>
-          <a:xfrm>
-            <a:off x="166443" y="1889068"/>
-            <a:ext cx="4315987" cy="4947178"/>
-          </a:xfrm>
-          <a:prstGeom prst="rect">
-            <a:avLst/>
-          </a:prstGeom>
-        </p:spPr>
-      </p:pic>
       <p:sp>
         <p:nvSpPr>
           <p:cNvPr id="5122" name="Rectangle 2">
@@ -11976,27 +12303,7 @@
                 <a:latin typeface="맑은 고딕" panose="020B0503020000020004" pitchFamily="50" charset="-127"/>
                 <a:ea typeface="맑은 고딕" panose="020B0503020000020004" pitchFamily="50" charset="-127"/>
               </a:rPr>
-              <a:t>교재를 통해 교안이 맞았음을 알게되었고</a:t>
-            </a:r>
-            <a:r>
-              <a:rPr lang="en-US" altLang="ko-KR" sz="1400">
-                <a:solidFill>
-                  <a:srgbClr val="000000"/>
-                </a:solidFill>
-                <a:latin typeface="맑은 고딕" panose="020B0503020000020004" pitchFamily="50" charset="-127"/>
-                <a:ea typeface="맑은 고딕" panose="020B0503020000020004" pitchFamily="50" charset="-127"/>
-              </a:rPr>
-              <a:t>, </a:t>
-            </a:r>
-            <a:r>
-              <a:rPr lang="ko-KR" altLang="en-US" sz="1400">
-                <a:solidFill>
-                  <a:srgbClr val="000000"/>
-                </a:solidFill>
-                <a:latin typeface="맑은 고딕" panose="020B0503020000020004" pitchFamily="50" charset="-127"/>
-                <a:ea typeface="맑은 고딕" panose="020B0503020000020004" pitchFamily="50" charset="-127"/>
-              </a:rPr>
-              <a:t>해당 교안을 고도화시킬 수 있었다</a:t>
+              <a:t>당시 둘다 답변을 들었다</a:t>
             </a:r>
             <a:r>
               <a:rPr lang="en-US" altLang="ko-KR" sz="1400">
@@ -12011,86 +12318,12 @@
           </a:p>
         </p:txBody>
       </p:sp>
-      <p:sp>
-        <p:nvSpPr>
-          <p:cNvPr id="11" name="액자 10">
+      <p:pic>
+        <p:nvPicPr>
+          <p:cNvPr id="11" name="그림 10">
             <a:extLst>
               <a:ext uri="{FF2B5EF4-FFF2-40B4-BE49-F238E27FC236}">
-                <a16:creationId xmlns:a16="http://schemas.microsoft.com/office/drawing/2014/main" id="{680DBF0D-8036-484A-ADC9-06ED15DF8E40}"/>
-              </a:ext>
-            </a:extLst>
-          </p:cNvPr>
-          <p:cNvSpPr/>
-          <p:nvPr/>
-        </p:nvSpPr>
-        <p:spPr bwMode="auto">
-          <a:xfrm>
-            <a:off x="94435" y="4344361"/>
-            <a:ext cx="4536504" cy="1532911"/>
-          </a:xfrm>
-          <a:prstGeom prst="frame">
-            <a:avLst>
-              <a:gd name="adj1" fmla="val 4822"/>
-            </a:avLst>
-          </a:prstGeom>
-          <a:solidFill>
-            <a:srgbClr val="FF5050"/>
-          </a:solidFill>
-          <a:ln w="9525" cap="flat" cmpd="sng" algn="ctr">
-            <a:solidFill>
-              <a:schemeClr val="tx1"/>
-            </a:solidFill>
-            <a:prstDash val="solid"/>
-            <a:round/>
-            <a:headEnd type="none" w="med" len="med"/>
-            <a:tailEnd type="none" w="med" len="med"/>
-          </a:ln>
-          <a:effectLst/>
-        </p:spPr>
-        <p:txBody>
-          <a:bodyPr vert="horz" wrap="square" lIns="91440" tIns="45720" rIns="91440" bIns="45720" numCol="1" rtlCol="0" anchor="t" anchorCtr="0" compatLnSpc="1">
-            <a:prstTxWarp prst="textNoShape">
-              <a:avLst/>
-            </a:prstTxWarp>
-          </a:bodyPr>
-          <a:lstStyle/>
-          <a:p>
-            <a:pPr marL="0" marR="0" indent="0" algn="l" defTabSz="914400" rtl="0" eaLnBrk="1" fontAlgn="base" latinLnBrk="0" hangingPunct="1">
-              <a:lnSpc>
-                <a:spcPct val="100000"/>
-              </a:lnSpc>
-              <a:spcBef>
-                <a:spcPct val="0"/>
-              </a:spcBef>
-              <a:spcAft>
-                <a:spcPct val="0"/>
-              </a:spcAft>
-              <a:buClrTx/>
-              <a:buSzTx/>
-              <a:buFontTx/>
-              <a:buNone/>
-              <a:tabLst/>
-            </a:pPr>
-            <a:endParaRPr kumimoji="0" lang="ko-KR" altLang="en-US" sz="1800" b="0" i="0" u="none" strike="noStrike" cap="none" normalizeH="0" baseline="0">
-              <a:ln>
-                <a:noFill/>
-              </a:ln>
-              <a:solidFill>
-                <a:schemeClr val="tx1"/>
-              </a:solidFill>
-              <a:effectLst/>
-              <a:latin typeface="Arial" panose="020B0604020202020204" pitchFamily="34" charset="0"/>
-              <a:cs typeface="Arial" panose="020B0604020202020204" pitchFamily="34" charset="0"/>
-            </a:endParaRPr>
-          </a:p>
-        </p:txBody>
-      </p:sp>
-      <p:pic>
-        <p:nvPicPr>
-          <p:cNvPr id="7" name="그림 6">
-            <a:extLst>
-              <a:ext uri="{FF2B5EF4-FFF2-40B4-BE49-F238E27FC236}">
-                <a16:creationId xmlns:a16="http://schemas.microsoft.com/office/drawing/2014/main" id="{60BAA3F0-B195-46D1-9038-25CEEBDEE083}"/>
+                <a16:creationId xmlns:a16="http://schemas.microsoft.com/office/drawing/2014/main" id="{40AE23E7-2A89-4F30-890F-19FEC0189214}"/>
               </a:ext>
             </a:extLst>
           </p:cNvPr>
@@ -12100,159 +12333,21 @@
           <p:nvPr/>
         </p:nvPicPr>
         <p:blipFill>
-          <a:blip r:embed="rId3"/>
+          <a:blip r:embed="rId2"/>
           <a:stretch>
             <a:fillRect/>
           </a:stretch>
         </p:blipFill>
         <p:spPr>
           <a:xfrm>
-            <a:off x="4797574" y="2731303"/>
-            <a:ext cx="4091298" cy="3030346"/>
+            <a:off x="1025860" y="1743680"/>
+            <a:ext cx="7092280" cy="4821419"/>
           </a:xfrm>
           <a:prstGeom prst="rect">
             <a:avLst/>
           </a:prstGeom>
         </p:spPr>
       </p:pic>
-      <p:cxnSp>
-        <p:nvCxnSpPr>
-          <p:cNvPr id="14" name="직선 연결선 13">
-            <a:extLst>
-              <a:ext uri="{FF2B5EF4-FFF2-40B4-BE49-F238E27FC236}">
-                <a16:creationId xmlns:a16="http://schemas.microsoft.com/office/drawing/2014/main" id="{E967AB7B-7458-4B35-98C0-96D095A62CFC}"/>
-              </a:ext>
-            </a:extLst>
-          </p:cNvPr>
-          <p:cNvCxnSpPr/>
-          <p:nvPr/>
-        </p:nvCxnSpPr>
-        <p:spPr bwMode="auto">
-          <a:xfrm>
-            <a:off x="4932040" y="3861048"/>
-            <a:ext cx="1008112" cy="0"/>
-          </a:xfrm>
-          <a:prstGeom prst="line">
-            <a:avLst/>
-          </a:prstGeom>
-          <a:solidFill>
-            <a:schemeClr val="accent1"/>
-          </a:solidFill>
-          <a:ln w="25400" cap="flat" cmpd="sng" algn="ctr">
-            <a:solidFill>
-              <a:srgbClr val="FF5050"/>
-            </a:solidFill>
-            <a:prstDash val="solid"/>
-            <a:round/>
-            <a:headEnd type="none" w="med" len="med"/>
-            <a:tailEnd type="none" w="med" len="med"/>
-          </a:ln>
-          <a:effectLst/>
-          <a:extLst>
-            <a:ext uri="{AF507438-7753-43E0-B8FC-AC1667EBCBE1}">
-              <a14:hiddenEffects xmlns:a14="http://schemas.microsoft.com/office/drawing/2010/main">
-                <a:effectLst>
-                  <a:outerShdw dist="35921" dir="2700000" algn="ctr" rotWithShape="0">
-                    <a:schemeClr val="bg2"/>
-                  </a:outerShdw>
-                </a:effectLst>
-              </a14:hiddenEffects>
-            </a:ext>
-          </a:extLst>
-        </p:spPr>
-      </p:cxnSp>
-      <p:cxnSp>
-        <p:nvCxnSpPr>
-          <p:cNvPr id="16" name="직선 연결선 15">
-            <a:extLst>
-              <a:ext uri="{FF2B5EF4-FFF2-40B4-BE49-F238E27FC236}">
-                <a16:creationId xmlns:a16="http://schemas.microsoft.com/office/drawing/2014/main" id="{3D128CA1-5BA6-4EAC-AC02-689EC8A2FFC2}"/>
-              </a:ext>
-            </a:extLst>
-          </p:cNvPr>
-          <p:cNvCxnSpPr/>
-          <p:nvPr/>
-        </p:nvCxnSpPr>
-        <p:spPr bwMode="auto">
-          <a:xfrm>
-            <a:off x="4932040" y="4149080"/>
-            <a:ext cx="2088232" cy="0"/>
-          </a:xfrm>
-          <a:prstGeom prst="line">
-            <a:avLst/>
-          </a:prstGeom>
-          <a:solidFill>
-            <a:schemeClr val="accent1"/>
-          </a:solidFill>
-          <a:ln w="25400" cap="flat" cmpd="sng" algn="ctr">
-            <a:solidFill>
-              <a:srgbClr val="FF5050"/>
-            </a:solidFill>
-            <a:prstDash val="solid"/>
-            <a:round/>
-            <a:headEnd type="none" w="med" len="med"/>
-            <a:tailEnd type="none" w="med" len="med"/>
-          </a:ln>
-          <a:effectLst/>
-          <a:extLst>
-            <a:ext uri="{AF507438-7753-43E0-B8FC-AC1667EBCBE1}">
-              <a14:hiddenEffects xmlns:a14="http://schemas.microsoft.com/office/drawing/2010/main">
-                <a:effectLst>
-                  <a:outerShdw dist="35921" dir="2700000" algn="ctr" rotWithShape="0">
-                    <a:schemeClr val="bg2"/>
-                  </a:outerShdw>
-                </a:effectLst>
-              </a14:hiddenEffects>
-            </a:ext>
-          </a:extLst>
-        </p:spPr>
-      </p:cxnSp>
-      <p:cxnSp>
-        <p:nvCxnSpPr>
-          <p:cNvPr id="17" name="직선 연결선 16">
-            <a:extLst>
-              <a:ext uri="{FF2B5EF4-FFF2-40B4-BE49-F238E27FC236}">
-                <a16:creationId xmlns:a16="http://schemas.microsoft.com/office/drawing/2014/main" id="{E6CE5406-25AC-4409-BF79-85062705AEE6}"/>
-              </a:ext>
-            </a:extLst>
-          </p:cNvPr>
-          <p:cNvCxnSpPr/>
-          <p:nvPr/>
-        </p:nvCxnSpPr>
-        <p:spPr bwMode="auto">
-          <a:xfrm>
-            <a:off x="5004048" y="5765449"/>
-            <a:ext cx="2088232" cy="0"/>
-          </a:xfrm>
-          <a:prstGeom prst="line">
-            <a:avLst/>
-          </a:prstGeom>
-          <a:solidFill>
-            <a:schemeClr val="accent1"/>
-          </a:solidFill>
-          <a:ln w="25400" cap="flat" cmpd="sng" algn="ctr">
-            <a:solidFill>
-              <a:srgbClr val="FF5050"/>
-            </a:solidFill>
-            <a:prstDash val="solid"/>
-            <a:round/>
-            <a:headEnd type="none" w="med" len="med"/>
-            <a:tailEnd type="none" w="med" len="med"/>
-          </a:ln>
-          <a:effectLst/>
-          <a:extLst>
-            <a:ext uri="{AF507438-7753-43E0-B8FC-AC1667EBCBE1}">
-              <a14:hiddenEffects xmlns:a14="http://schemas.microsoft.com/office/drawing/2010/main">
-                <a:effectLst>
-                  <a:outerShdw dist="35921" dir="2700000" algn="ctr" rotWithShape="0">
-                    <a:schemeClr val="bg2"/>
-                  </a:outerShdw>
-                </a:effectLst>
-              </a14:hiddenEffects>
-            </a:ext>
-          </a:extLst>
-        </p:spPr>
-      </p:cxnSp>
     </p:spTree>
     <p:extLst>
       <p:ext uri="{BB962C8B-B14F-4D97-AF65-F5344CB8AC3E}">

</xml_diff>